<commit_message>
added work flow of checking shopping cart and presentation slides
</commit_message>
<xml_diff>
--- a/flow.pptx
+++ b/flow.pptx
@@ -6,6 +6,7 @@
   </p:sldMasterIdLst>
   <p:sldIdLst>
     <p:sldId id="256" r:id="rId2"/>
+    <p:sldId id="257" r:id="rId3"/>
   </p:sldIdLst>
   <p:sldSz cx="12192000" cy="6858000"/>
   <p:notesSz cx="6858000" cy="9144000"/>
@@ -104,6 +105,11 @@
       </a:defRPr>
     </a:lvl9pPr>
   </p:defaultTextStyle>
+  <p:extLst>
+    <p:ext uri="{EFAFB233-063F-42B5-8137-9DF3F51BA10A}">
+      <p15:sldGuideLst xmlns:p15="http://schemas.microsoft.com/office/powerpoint/2012/main"/>
+    </p:ext>
+  </p:extLst>
 </p:presentation>
 </file>
 
@@ -4741,6 +4747,1044 @@
 </p:sld>
 </file>
 
+<file path=ppt/slides/slide2.xml><?xml version="1.0" encoding="utf-8"?>
+<p:sld xmlns:a="http://schemas.openxmlformats.org/drawingml/2006/main" xmlns:r="http://schemas.openxmlformats.org/officeDocument/2006/relationships" xmlns:p="http://schemas.openxmlformats.org/presentationml/2006/main">
+  <p:cSld>
+    <p:spTree>
+      <p:nvGrpSpPr>
+        <p:cNvPr id="1" name=""/>
+        <p:cNvGrpSpPr/>
+        <p:nvPr/>
+      </p:nvGrpSpPr>
+      <p:grpSpPr>
+        <a:xfrm>
+          <a:off x="0" y="0"/>
+          <a:ext cx="0" cy="0"/>
+          <a:chOff x="0" y="0"/>
+          <a:chExt cx="0" cy="0"/>
+        </a:xfrm>
+      </p:grpSpPr>
+      <p:sp>
+        <p:nvSpPr>
+          <p:cNvPr id="4" name="TextBox 3">
+            <a:extLst>
+              <a:ext uri="{FF2B5EF4-FFF2-40B4-BE49-F238E27FC236}">
+                <a16:creationId xmlns:a16="http://schemas.microsoft.com/office/drawing/2014/main" id="{B06602F3-9D29-4247-985D-12502109ABAA}"/>
+              </a:ext>
+            </a:extLst>
+          </p:cNvPr>
+          <p:cNvSpPr txBox="1"/>
+          <p:nvPr/>
+        </p:nvSpPr>
+        <p:spPr>
+          <a:xfrm>
+            <a:off x="861270" y="438150"/>
+            <a:ext cx="1181099" cy="369332"/>
+          </a:xfrm>
+          <a:prstGeom prst="rect">
+            <a:avLst/>
+          </a:prstGeom>
+          <a:noFill/>
+          <a:ln w="19050">
+            <a:solidFill>
+              <a:schemeClr val="tx1"/>
+            </a:solidFill>
+          </a:ln>
+        </p:spPr>
+        <p:txBody>
+          <a:bodyPr wrap="square" rtlCol="0">
+            <a:spAutoFit/>
+          </a:bodyPr>
+          <a:lstStyle/>
+          <a:p>
+            <a:r>
+              <a:rPr lang="en-US" altLang="zh-CN" dirty="0"/>
+              <a:t>Greetings</a:t>
+            </a:r>
+            <a:endParaRPr lang="en-AU" dirty="0"/>
+          </a:p>
+        </p:txBody>
+      </p:sp>
+      <p:sp>
+        <p:nvSpPr>
+          <p:cNvPr id="5" name="TextBox 4">
+            <a:extLst>
+              <a:ext uri="{FF2B5EF4-FFF2-40B4-BE49-F238E27FC236}">
+                <a16:creationId xmlns:a16="http://schemas.microsoft.com/office/drawing/2014/main" id="{DAEFFF76-7486-4817-841B-C97BC0283356}"/>
+              </a:ext>
+            </a:extLst>
+          </p:cNvPr>
+          <p:cNvSpPr txBox="1"/>
+          <p:nvPr/>
+        </p:nvSpPr>
+        <p:spPr>
+          <a:xfrm>
+            <a:off x="670540" y="1459440"/>
+            <a:ext cx="1537544" cy="646331"/>
+          </a:xfrm>
+          <a:prstGeom prst="rect">
+            <a:avLst/>
+          </a:prstGeom>
+          <a:noFill/>
+          <a:ln w="19050">
+            <a:solidFill>
+              <a:schemeClr val="tx1"/>
+            </a:solidFill>
+          </a:ln>
+        </p:spPr>
+        <p:txBody>
+          <a:bodyPr wrap="square" rtlCol="0">
+            <a:spAutoFit/>
+          </a:bodyPr>
+          <a:lstStyle/>
+          <a:p>
+            <a:r>
+              <a:rPr lang="en-AU" dirty="0"/>
+              <a:t>Check the shopping cart</a:t>
+            </a:r>
+          </a:p>
+        </p:txBody>
+      </p:sp>
+      <p:sp>
+        <p:nvSpPr>
+          <p:cNvPr id="6" name="TextBox 5">
+            <a:extLst>
+              <a:ext uri="{FF2B5EF4-FFF2-40B4-BE49-F238E27FC236}">
+                <a16:creationId xmlns:a16="http://schemas.microsoft.com/office/drawing/2014/main" id="{EDB269F3-0EF0-44CA-8914-B3141A2FA0CD}"/>
+              </a:ext>
+            </a:extLst>
+          </p:cNvPr>
+          <p:cNvSpPr txBox="1"/>
+          <p:nvPr/>
+        </p:nvSpPr>
+        <p:spPr>
+          <a:xfrm>
+            <a:off x="624925" y="2465344"/>
+            <a:ext cx="1628774" cy="646331"/>
+          </a:xfrm>
+          <a:prstGeom prst="rect">
+            <a:avLst/>
+          </a:prstGeom>
+          <a:noFill/>
+          <a:ln w="19050">
+            <a:solidFill>
+              <a:schemeClr val="tx1"/>
+            </a:solidFill>
+          </a:ln>
+        </p:spPr>
+        <p:txBody>
+          <a:bodyPr wrap="square" rtlCol="0">
+            <a:spAutoFit/>
+          </a:bodyPr>
+          <a:lstStyle/>
+          <a:p>
+            <a:r>
+              <a:rPr lang="en-US" dirty="0"/>
+              <a:t>Show the current cart</a:t>
+            </a:r>
+            <a:endParaRPr lang="en-AU" dirty="0"/>
+          </a:p>
+        </p:txBody>
+      </p:sp>
+      <p:sp>
+        <p:nvSpPr>
+          <p:cNvPr id="7" name="Diamond 6">
+            <a:extLst>
+              <a:ext uri="{FF2B5EF4-FFF2-40B4-BE49-F238E27FC236}">
+                <a16:creationId xmlns:a16="http://schemas.microsoft.com/office/drawing/2014/main" id="{AAE14001-BFD3-47C1-9AA3-BD161F2A5599}"/>
+              </a:ext>
+            </a:extLst>
+          </p:cNvPr>
+          <p:cNvSpPr/>
+          <p:nvPr/>
+        </p:nvSpPr>
+        <p:spPr>
+          <a:xfrm>
+            <a:off x="359420" y="3558249"/>
+            <a:ext cx="2128086" cy="748146"/>
+          </a:xfrm>
+          <a:prstGeom prst="diamond">
+            <a:avLst/>
+          </a:prstGeom>
+          <a:solidFill>
+            <a:schemeClr val="bg1"/>
+          </a:solidFill>
+          <a:ln w="19050"/>
+        </p:spPr>
+        <p:style>
+          <a:lnRef idx="2">
+            <a:schemeClr val="accent1">
+              <a:shade val="50000"/>
+            </a:schemeClr>
+          </a:lnRef>
+          <a:fillRef idx="1">
+            <a:schemeClr val="accent1"/>
+          </a:fillRef>
+          <a:effectRef idx="0">
+            <a:schemeClr val="accent1"/>
+          </a:effectRef>
+          <a:fontRef idx="minor">
+            <a:schemeClr val="lt1"/>
+          </a:fontRef>
+        </p:style>
+        <p:txBody>
+          <a:bodyPr rtlCol="0" anchor="ctr"/>
+          <a:lstStyle/>
+          <a:p>
+            <a:pPr algn="ctr"/>
+            <a:endParaRPr lang="en-AU"/>
+          </a:p>
+        </p:txBody>
+      </p:sp>
+      <p:sp>
+        <p:nvSpPr>
+          <p:cNvPr id="8" name="TextBox 7">
+            <a:extLst>
+              <a:ext uri="{FF2B5EF4-FFF2-40B4-BE49-F238E27FC236}">
+                <a16:creationId xmlns:a16="http://schemas.microsoft.com/office/drawing/2014/main" id="{1ACB3605-9836-4F12-A871-BEB78543DFD3}"/>
+              </a:ext>
+            </a:extLst>
+          </p:cNvPr>
+          <p:cNvSpPr txBox="1"/>
+          <p:nvPr/>
+        </p:nvSpPr>
+        <p:spPr>
+          <a:xfrm>
+            <a:off x="711438" y="3711427"/>
+            <a:ext cx="2719449" cy="369332"/>
+          </a:xfrm>
+          <a:prstGeom prst="rect">
+            <a:avLst/>
+          </a:prstGeom>
+          <a:noFill/>
+        </p:spPr>
+        <p:txBody>
+          <a:bodyPr wrap="square" rtlCol="0">
+            <a:spAutoFit/>
+          </a:bodyPr>
+          <a:lstStyle/>
+          <a:p>
+            <a:r>
+              <a:rPr lang="en-AU" dirty="0"/>
+              <a:t>Anything delete?</a:t>
+            </a:r>
+          </a:p>
+        </p:txBody>
+      </p:sp>
+      <p:cxnSp>
+        <p:nvCxnSpPr>
+          <p:cNvPr id="10" name="Straight Connector 9">
+            <a:extLst>
+              <a:ext uri="{FF2B5EF4-FFF2-40B4-BE49-F238E27FC236}">
+                <a16:creationId xmlns:a16="http://schemas.microsoft.com/office/drawing/2014/main" id="{F55734DD-F931-4760-BCD4-700790AFA462}"/>
+              </a:ext>
+            </a:extLst>
+          </p:cNvPr>
+          <p:cNvCxnSpPr>
+            <a:cxnSpLocks/>
+            <a:stCxn id="4" idx="2"/>
+            <a:endCxn id="5" idx="0"/>
+          </p:cNvCxnSpPr>
+          <p:nvPr/>
+        </p:nvCxnSpPr>
+        <p:spPr>
+          <a:xfrm flipH="1">
+            <a:off x="1439312" y="807482"/>
+            <a:ext cx="12508" cy="651958"/>
+          </a:xfrm>
+          <a:prstGeom prst="line">
+            <a:avLst/>
+          </a:prstGeom>
+          <a:ln w="19050"/>
+        </p:spPr>
+        <p:style>
+          <a:lnRef idx="1">
+            <a:schemeClr val="dk1"/>
+          </a:lnRef>
+          <a:fillRef idx="0">
+            <a:schemeClr val="dk1"/>
+          </a:fillRef>
+          <a:effectRef idx="0">
+            <a:schemeClr val="dk1"/>
+          </a:effectRef>
+          <a:fontRef idx="minor">
+            <a:schemeClr val="tx1"/>
+          </a:fontRef>
+        </p:style>
+      </p:cxnSp>
+      <p:cxnSp>
+        <p:nvCxnSpPr>
+          <p:cNvPr id="11" name="Straight Connector 10">
+            <a:extLst>
+              <a:ext uri="{FF2B5EF4-FFF2-40B4-BE49-F238E27FC236}">
+                <a16:creationId xmlns:a16="http://schemas.microsoft.com/office/drawing/2014/main" id="{DD424766-0BE9-4762-B060-9E0C30B1477B}"/>
+              </a:ext>
+            </a:extLst>
+          </p:cNvPr>
+          <p:cNvCxnSpPr>
+            <a:cxnSpLocks/>
+            <a:stCxn id="5" idx="2"/>
+            <a:endCxn id="6" idx="0"/>
+          </p:cNvCxnSpPr>
+          <p:nvPr/>
+        </p:nvCxnSpPr>
+        <p:spPr>
+          <a:xfrm>
+            <a:off x="1439312" y="2105771"/>
+            <a:ext cx="0" cy="359573"/>
+          </a:xfrm>
+          <a:prstGeom prst="line">
+            <a:avLst/>
+          </a:prstGeom>
+          <a:ln w="19050"/>
+        </p:spPr>
+        <p:style>
+          <a:lnRef idx="1">
+            <a:schemeClr val="dk1"/>
+          </a:lnRef>
+          <a:fillRef idx="0">
+            <a:schemeClr val="dk1"/>
+          </a:fillRef>
+          <a:effectRef idx="0">
+            <a:schemeClr val="dk1"/>
+          </a:effectRef>
+          <a:fontRef idx="minor">
+            <a:schemeClr val="tx1"/>
+          </a:fontRef>
+        </p:style>
+      </p:cxnSp>
+      <p:cxnSp>
+        <p:nvCxnSpPr>
+          <p:cNvPr id="14" name="Straight Connector 13">
+            <a:extLst>
+              <a:ext uri="{FF2B5EF4-FFF2-40B4-BE49-F238E27FC236}">
+                <a16:creationId xmlns:a16="http://schemas.microsoft.com/office/drawing/2014/main" id="{3852D183-09E8-40EB-A700-7B85190248F8}"/>
+              </a:ext>
+            </a:extLst>
+          </p:cNvPr>
+          <p:cNvCxnSpPr>
+            <a:cxnSpLocks/>
+          </p:cNvCxnSpPr>
+          <p:nvPr/>
+        </p:nvCxnSpPr>
+        <p:spPr>
+          <a:xfrm>
+            <a:off x="1451819" y="3111675"/>
+            <a:ext cx="0" cy="441550"/>
+          </a:xfrm>
+          <a:prstGeom prst="line">
+            <a:avLst/>
+          </a:prstGeom>
+          <a:ln w="19050"/>
+        </p:spPr>
+        <p:style>
+          <a:lnRef idx="1">
+            <a:schemeClr val="dk1"/>
+          </a:lnRef>
+          <a:fillRef idx="0">
+            <a:schemeClr val="dk1"/>
+          </a:fillRef>
+          <a:effectRef idx="0">
+            <a:schemeClr val="dk1"/>
+          </a:effectRef>
+          <a:fontRef idx="minor">
+            <a:schemeClr val="tx1"/>
+          </a:fontRef>
+        </p:style>
+      </p:cxnSp>
+      <p:cxnSp>
+        <p:nvCxnSpPr>
+          <p:cNvPr id="15" name="Straight Connector 14">
+            <a:extLst>
+              <a:ext uri="{FF2B5EF4-FFF2-40B4-BE49-F238E27FC236}">
+                <a16:creationId xmlns:a16="http://schemas.microsoft.com/office/drawing/2014/main" id="{4CB8D30E-B98E-40D2-B8BB-977BF35652A7}"/>
+              </a:ext>
+            </a:extLst>
+          </p:cNvPr>
+          <p:cNvCxnSpPr>
+            <a:cxnSpLocks/>
+          </p:cNvCxnSpPr>
+          <p:nvPr/>
+        </p:nvCxnSpPr>
+        <p:spPr>
+          <a:xfrm>
+            <a:off x="1451819" y="4306395"/>
+            <a:ext cx="0" cy="441550"/>
+          </a:xfrm>
+          <a:prstGeom prst="line">
+            <a:avLst/>
+          </a:prstGeom>
+          <a:ln w="19050"/>
+        </p:spPr>
+        <p:style>
+          <a:lnRef idx="1">
+            <a:schemeClr val="dk1"/>
+          </a:lnRef>
+          <a:fillRef idx="0">
+            <a:schemeClr val="dk1"/>
+          </a:fillRef>
+          <a:effectRef idx="0">
+            <a:schemeClr val="dk1"/>
+          </a:effectRef>
+          <a:fontRef idx="minor">
+            <a:schemeClr val="tx1"/>
+          </a:fontRef>
+        </p:style>
+      </p:cxnSp>
+      <p:sp>
+        <p:nvSpPr>
+          <p:cNvPr id="16" name="TextBox 15">
+            <a:extLst>
+              <a:ext uri="{FF2B5EF4-FFF2-40B4-BE49-F238E27FC236}">
+                <a16:creationId xmlns:a16="http://schemas.microsoft.com/office/drawing/2014/main" id="{1C0AD5E8-8CB2-45CA-8973-5873E7A22F05}"/>
+              </a:ext>
+            </a:extLst>
+          </p:cNvPr>
+          <p:cNvSpPr txBox="1"/>
+          <p:nvPr/>
+        </p:nvSpPr>
+        <p:spPr>
+          <a:xfrm>
+            <a:off x="1549449" y="4276063"/>
+            <a:ext cx="985839" cy="369332"/>
+          </a:xfrm>
+          <a:prstGeom prst="rect">
+            <a:avLst/>
+          </a:prstGeom>
+          <a:noFill/>
+        </p:spPr>
+        <p:txBody>
+          <a:bodyPr wrap="square" rtlCol="0">
+            <a:spAutoFit/>
+          </a:bodyPr>
+          <a:lstStyle/>
+          <a:p>
+            <a:r>
+              <a:rPr lang="en-AU" dirty="0"/>
+              <a:t>yes</a:t>
+            </a:r>
+          </a:p>
+        </p:txBody>
+      </p:sp>
+      <p:sp>
+        <p:nvSpPr>
+          <p:cNvPr id="19" name="TextBox 18">
+            <a:extLst>
+              <a:ext uri="{FF2B5EF4-FFF2-40B4-BE49-F238E27FC236}">
+                <a16:creationId xmlns:a16="http://schemas.microsoft.com/office/drawing/2014/main" id="{B6F3E96A-F948-4BC5-9898-EE619D47E5CA}"/>
+              </a:ext>
+            </a:extLst>
+          </p:cNvPr>
+          <p:cNvSpPr txBox="1"/>
+          <p:nvPr/>
+        </p:nvSpPr>
+        <p:spPr>
+          <a:xfrm>
+            <a:off x="11903" y="4747945"/>
+            <a:ext cx="985839" cy="369332"/>
+          </a:xfrm>
+          <a:prstGeom prst="rect">
+            <a:avLst/>
+          </a:prstGeom>
+          <a:noFill/>
+        </p:spPr>
+        <p:txBody>
+          <a:bodyPr wrap="square" rtlCol="0">
+            <a:spAutoFit/>
+          </a:bodyPr>
+          <a:lstStyle/>
+          <a:p>
+            <a:r>
+              <a:rPr lang="en-AU" dirty="0"/>
+              <a:t>no</a:t>
+            </a:r>
+          </a:p>
+        </p:txBody>
+      </p:sp>
+      <p:sp>
+        <p:nvSpPr>
+          <p:cNvPr id="22" name="Diamond 21">
+            <a:extLst>
+              <a:ext uri="{FF2B5EF4-FFF2-40B4-BE49-F238E27FC236}">
+                <a16:creationId xmlns:a16="http://schemas.microsoft.com/office/drawing/2014/main" id="{702A4A5D-7B21-437A-816D-251F67EE06AF}"/>
+              </a:ext>
+            </a:extLst>
+          </p:cNvPr>
+          <p:cNvSpPr/>
+          <p:nvPr/>
+        </p:nvSpPr>
+        <p:spPr>
+          <a:xfrm>
+            <a:off x="392142" y="5662780"/>
+            <a:ext cx="2030462" cy="748146"/>
+          </a:xfrm>
+          <a:prstGeom prst="diamond">
+            <a:avLst/>
+          </a:prstGeom>
+          <a:solidFill>
+            <a:schemeClr val="bg1"/>
+          </a:solidFill>
+          <a:ln w="19050"/>
+        </p:spPr>
+        <p:style>
+          <a:lnRef idx="2">
+            <a:schemeClr val="accent1">
+              <a:shade val="50000"/>
+            </a:schemeClr>
+          </a:lnRef>
+          <a:fillRef idx="1">
+            <a:schemeClr val="accent1"/>
+          </a:fillRef>
+          <a:effectRef idx="0">
+            <a:schemeClr val="accent1"/>
+          </a:effectRef>
+          <a:fontRef idx="minor">
+            <a:schemeClr val="lt1"/>
+          </a:fontRef>
+        </p:style>
+        <p:txBody>
+          <a:bodyPr rtlCol="0" anchor="ctr"/>
+          <a:lstStyle/>
+          <a:p>
+            <a:pPr algn="ctr"/>
+            <a:endParaRPr lang="en-AU"/>
+          </a:p>
+        </p:txBody>
+      </p:sp>
+      <p:sp>
+        <p:nvSpPr>
+          <p:cNvPr id="21" name="TextBox 20">
+            <a:extLst>
+              <a:ext uri="{FF2B5EF4-FFF2-40B4-BE49-F238E27FC236}">
+                <a16:creationId xmlns:a16="http://schemas.microsoft.com/office/drawing/2014/main" id="{8A4868CE-82B2-41AA-A959-746F8D14DDF3}"/>
+              </a:ext>
+            </a:extLst>
+          </p:cNvPr>
+          <p:cNvSpPr txBox="1"/>
+          <p:nvPr/>
+        </p:nvSpPr>
+        <p:spPr>
+          <a:xfrm>
+            <a:off x="808322" y="5853324"/>
+            <a:ext cx="2719449" cy="369332"/>
+          </a:xfrm>
+          <a:prstGeom prst="rect">
+            <a:avLst/>
+          </a:prstGeom>
+          <a:noFill/>
+        </p:spPr>
+        <p:txBody>
+          <a:bodyPr wrap="square" rtlCol="0">
+            <a:spAutoFit/>
+          </a:bodyPr>
+          <a:lstStyle/>
+          <a:p>
+            <a:r>
+              <a:rPr lang="en-AU" dirty="0"/>
+              <a:t>Check out?</a:t>
+            </a:r>
+          </a:p>
+        </p:txBody>
+      </p:sp>
+      <p:sp>
+        <p:nvSpPr>
+          <p:cNvPr id="48" name="TextBox 47">
+            <a:extLst>
+              <a:ext uri="{FF2B5EF4-FFF2-40B4-BE49-F238E27FC236}">
+                <a16:creationId xmlns:a16="http://schemas.microsoft.com/office/drawing/2014/main" id="{5CD601FE-E200-4A70-9918-16A742DC2FAE}"/>
+              </a:ext>
+            </a:extLst>
+          </p:cNvPr>
+          <p:cNvSpPr txBox="1"/>
+          <p:nvPr/>
+        </p:nvSpPr>
+        <p:spPr>
+          <a:xfrm>
+            <a:off x="984631" y="4720712"/>
+            <a:ext cx="973215" cy="369332"/>
+          </a:xfrm>
+          <a:prstGeom prst="rect">
+            <a:avLst/>
+          </a:prstGeom>
+          <a:noFill/>
+          <a:ln w="19050">
+            <a:solidFill>
+              <a:schemeClr val="tx1"/>
+            </a:solidFill>
+          </a:ln>
+        </p:spPr>
+        <p:txBody>
+          <a:bodyPr wrap="square" rtlCol="0">
+            <a:spAutoFit/>
+          </a:bodyPr>
+          <a:lstStyle/>
+          <a:p>
+            <a:r>
+              <a:rPr lang="en-US" altLang="zh-CN" dirty="0"/>
+              <a:t>Deleted</a:t>
+            </a:r>
+            <a:endParaRPr lang="en-AU" dirty="0"/>
+          </a:p>
+        </p:txBody>
+      </p:sp>
+      <p:cxnSp>
+        <p:nvCxnSpPr>
+          <p:cNvPr id="53" name="Straight Arrow Connector 52">
+            <a:extLst>
+              <a:ext uri="{FF2B5EF4-FFF2-40B4-BE49-F238E27FC236}">
+                <a16:creationId xmlns:a16="http://schemas.microsoft.com/office/drawing/2014/main" id="{F28BB29A-A87B-4874-B420-9FB7FD70A257}"/>
+              </a:ext>
+            </a:extLst>
+          </p:cNvPr>
+          <p:cNvCxnSpPr>
+            <a:cxnSpLocks/>
+            <a:stCxn id="7" idx="1"/>
+          </p:cNvCxnSpPr>
+          <p:nvPr/>
+        </p:nvCxnSpPr>
+        <p:spPr>
+          <a:xfrm>
+            <a:off x="359420" y="3932322"/>
+            <a:ext cx="0" cy="2120538"/>
+          </a:xfrm>
+          <a:prstGeom prst="straightConnector1">
+            <a:avLst/>
+          </a:prstGeom>
+          <a:ln w="19050">
+            <a:tailEnd type="triangle"/>
+          </a:ln>
+        </p:spPr>
+        <p:style>
+          <a:lnRef idx="1">
+            <a:schemeClr val="dk1"/>
+          </a:lnRef>
+          <a:fillRef idx="0">
+            <a:schemeClr val="dk1"/>
+          </a:fillRef>
+          <a:effectRef idx="0">
+            <a:schemeClr val="dk1"/>
+          </a:effectRef>
+          <a:fontRef idx="minor">
+            <a:schemeClr val="tx1"/>
+          </a:fontRef>
+        </p:style>
+      </p:cxnSp>
+      <p:sp>
+        <p:nvSpPr>
+          <p:cNvPr id="56" name="TextBox 55">
+            <a:extLst>
+              <a:ext uri="{FF2B5EF4-FFF2-40B4-BE49-F238E27FC236}">
+                <a16:creationId xmlns:a16="http://schemas.microsoft.com/office/drawing/2014/main" id="{5304AC3B-37F4-408A-8A65-5D2137ABEFD4}"/>
+              </a:ext>
+            </a:extLst>
+          </p:cNvPr>
+          <p:cNvSpPr txBox="1"/>
+          <p:nvPr/>
+        </p:nvSpPr>
+        <p:spPr>
+          <a:xfrm>
+            <a:off x="2487506" y="6115924"/>
+            <a:ext cx="985839" cy="369332"/>
+          </a:xfrm>
+          <a:prstGeom prst="rect">
+            <a:avLst/>
+          </a:prstGeom>
+          <a:noFill/>
+        </p:spPr>
+        <p:txBody>
+          <a:bodyPr wrap="square" rtlCol="0">
+            <a:spAutoFit/>
+          </a:bodyPr>
+          <a:lstStyle/>
+          <a:p>
+            <a:r>
+              <a:rPr lang="en-AU" dirty="0"/>
+              <a:t>no</a:t>
+            </a:r>
+          </a:p>
+        </p:txBody>
+      </p:sp>
+      <p:cxnSp>
+        <p:nvCxnSpPr>
+          <p:cNvPr id="59" name="Straight Connector 58">
+            <a:extLst>
+              <a:ext uri="{FF2B5EF4-FFF2-40B4-BE49-F238E27FC236}">
+                <a16:creationId xmlns:a16="http://schemas.microsoft.com/office/drawing/2014/main" id="{23B93868-D4FC-48C0-AB88-943634190E84}"/>
+              </a:ext>
+            </a:extLst>
+          </p:cNvPr>
+          <p:cNvCxnSpPr>
+            <a:cxnSpLocks/>
+          </p:cNvCxnSpPr>
+          <p:nvPr/>
+        </p:nvCxnSpPr>
+        <p:spPr>
+          <a:xfrm>
+            <a:off x="1451821" y="6398827"/>
+            <a:ext cx="3155805" cy="0"/>
+          </a:xfrm>
+          <a:prstGeom prst="line">
+            <a:avLst/>
+          </a:prstGeom>
+          <a:ln w="19050">
+            <a:solidFill>
+              <a:schemeClr val="tx1"/>
+            </a:solidFill>
+          </a:ln>
+        </p:spPr>
+        <p:style>
+          <a:lnRef idx="1">
+            <a:schemeClr val="accent1"/>
+          </a:lnRef>
+          <a:fillRef idx="0">
+            <a:schemeClr val="accent1"/>
+          </a:fillRef>
+          <a:effectRef idx="0">
+            <a:schemeClr val="accent1"/>
+          </a:effectRef>
+          <a:fontRef idx="minor">
+            <a:schemeClr val="tx1"/>
+          </a:fontRef>
+        </p:style>
+      </p:cxnSp>
+      <p:sp>
+        <p:nvSpPr>
+          <p:cNvPr id="62" name="TextBox 61">
+            <a:extLst>
+              <a:ext uri="{FF2B5EF4-FFF2-40B4-BE49-F238E27FC236}">
+                <a16:creationId xmlns:a16="http://schemas.microsoft.com/office/drawing/2014/main" id="{61E8883A-75EC-4292-BF8D-87C7015B155C}"/>
+              </a:ext>
+            </a:extLst>
+          </p:cNvPr>
+          <p:cNvSpPr txBox="1"/>
+          <p:nvPr/>
+        </p:nvSpPr>
+        <p:spPr>
+          <a:xfrm>
+            <a:off x="3671548" y="5847446"/>
+            <a:ext cx="1324214" cy="369332"/>
+          </a:xfrm>
+          <a:prstGeom prst="rect">
+            <a:avLst/>
+          </a:prstGeom>
+          <a:noFill/>
+          <a:ln w="19050">
+            <a:solidFill>
+              <a:schemeClr val="tx1"/>
+            </a:solidFill>
+          </a:ln>
+        </p:spPr>
+        <p:txBody>
+          <a:bodyPr wrap="square" rtlCol="0">
+            <a:spAutoFit/>
+          </a:bodyPr>
+          <a:lstStyle/>
+          <a:p>
+            <a:r>
+              <a:rPr lang="en-US" altLang="zh-CN" dirty="0"/>
+              <a:t>Total </a:t>
+            </a:r>
+            <a:r>
+              <a:rPr lang="en-US" dirty="0"/>
+              <a:t>price</a:t>
+            </a:r>
+            <a:endParaRPr lang="en-AU" dirty="0"/>
+          </a:p>
+        </p:txBody>
+      </p:sp>
+      <p:sp>
+        <p:nvSpPr>
+          <p:cNvPr id="63" name="TextBox 62">
+            <a:extLst>
+              <a:ext uri="{FF2B5EF4-FFF2-40B4-BE49-F238E27FC236}">
+                <a16:creationId xmlns:a16="http://schemas.microsoft.com/office/drawing/2014/main" id="{C8283187-57D6-44FD-8E78-D5BD62FC61E8}"/>
+              </a:ext>
+            </a:extLst>
+          </p:cNvPr>
+          <p:cNvSpPr txBox="1"/>
+          <p:nvPr/>
+        </p:nvSpPr>
+        <p:spPr>
+          <a:xfrm>
+            <a:off x="2773106" y="5567508"/>
+            <a:ext cx="985839" cy="369332"/>
+          </a:xfrm>
+          <a:prstGeom prst="rect">
+            <a:avLst/>
+          </a:prstGeom>
+          <a:noFill/>
+        </p:spPr>
+        <p:txBody>
+          <a:bodyPr wrap="square" rtlCol="0">
+            <a:spAutoFit/>
+          </a:bodyPr>
+          <a:lstStyle/>
+          <a:p>
+            <a:r>
+              <a:rPr lang="en-AU" dirty="0"/>
+              <a:t>yes</a:t>
+            </a:r>
+          </a:p>
+        </p:txBody>
+      </p:sp>
+      <p:cxnSp>
+        <p:nvCxnSpPr>
+          <p:cNvPr id="66" name="Straight Connector 65">
+            <a:extLst>
+              <a:ext uri="{FF2B5EF4-FFF2-40B4-BE49-F238E27FC236}">
+                <a16:creationId xmlns:a16="http://schemas.microsoft.com/office/drawing/2014/main" id="{AA3726FC-23AA-454A-9209-2932F60AA949}"/>
+              </a:ext>
+            </a:extLst>
+          </p:cNvPr>
+          <p:cNvCxnSpPr>
+            <a:cxnSpLocks/>
+            <a:endCxn id="62" idx="1"/>
+          </p:cNvCxnSpPr>
+          <p:nvPr/>
+        </p:nvCxnSpPr>
+        <p:spPr>
+          <a:xfrm flipV="1">
+            <a:off x="2406449" y="6032112"/>
+            <a:ext cx="1265099" cy="8896"/>
+          </a:xfrm>
+          <a:prstGeom prst="line">
+            <a:avLst/>
+          </a:prstGeom>
+          <a:ln w="19050"/>
+        </p:spPr>
+        <p:style>
+          <a:lnRef idx="1">
+            <a:schemeClr val="dk1"/>
+          </a:lnRef>
+          <a:fillRef idx="0">
+            <a:schemeClr val="dk1"/>
+          </a:fillRef>
+          <a:effectRef idx="0">
+            <a:schemeClr val="dk1"/>
+          </a:effectRef>
+          <a:fontRef idx="minor">
+            <a:schemeClr val="tx1"/>
+          </a:fontRef>
+        </p:style>
+      </p:cxnSp>
+      <p:sp>
+        <p:nvSpPr>
+          <p:cNvPr id="67" name="TextBox 66">
+            <a:extLst>
+              <a:ext uri="{FF2B5EF4-FFF2-40B4-BE49-F238E27FC236}">
+                <a16:creationId xmlns:a16="http://schemas.microsoft.com/office/drawing/2014/main" id="{4DA248F7-FC6C-4965-9552-45F2692BC8A8}"/>
+              </a:ext>
+            </a:extLst>
+          </p:cNvPr>
+          <p:cNvSpPr txBox="1"/>
+          <p:nvPr/>
+        </p:nvSpPr>
+        <p:spPr>
+          <a:xfrm>
+            <a:off x="4624908" y="6298131"/>
+            <a:ext cx="985839" cy="369332"/>
+          </a:xfrm>
+          <a:prstGeom prst="rect">
+            <a:avLst/>
+          </a:prstGeom>
+          <a:noFill/>
+          <a:ln w="19050">
+            <a:solidFill>
+              <a:schemeClr val="tx1"/>
+            </a:solidFill>
+          </a:ln>
+        </p:spPr>
+        <p:txBody>
+          <a:bodyPr wrap="square" rtlCol="0">
+            <a:spAutoFit/>
+          </a:bodyPr>
+          <a:lstStyle/>
+          <a:p>
+            <a:r>
+              <a:rPr lang="en-US" altLang="zh-CN" dirty="0" err="1"/>
+              <a:t>Byebye</a:t>
+            </a:r>
+            <a:endParaRPr lang="en-AU" dirty="0"/>
+          </a:p>
+        </p:txBody>
+      </p:sp>
+      <p:sp>
+        <p:nvSpPr>
+          <p:cNvPr id="69" name="Rectangle 68">
+            <a:extLst>
+              <a:ext uri="{FF2B5EF4-FFF2-40B4-BE49-F238E27FC236}">
+                <a16:creationId xmlns:a16="http://schemas.microsoft.com/office/drawing/2014/main" id="{8BAB6F3F-6D20-4511-907B-029EA2BB26FA}"/>
+              </a:ext>
+            </a:extLst>
+          </p:cNvPr>
+          <p:cNvSpPr/>
+          <p:nvPr/>
+        </p:nvSpPr>
+        <p:spPr>
+          <a:xfrm>
+            <a:off x="2869263" y="622816"/>
+            <a:ext cx="5207643" cy="2585323"/>
+          </a:xfrm>
+          <a:prstGeom prst="rect">
+            <a:avLst/>
+          </a:prstGeom>
+          <a:noFill/>
+        </p:spPr>
+        <p:txBody>
+          <a:bodyPr wrap="none" lIns="91440" tIns="45720" rIns="91440" bIns="45720">
+            <a:spAutoFit/>
+          </a:bodyPr>
+          <a:lstStyle/>
+          <a:p>
+            <a:pPr algn="ctr"/>
+            <a:r>
+              <a:rPr lang="en-US" altLang="zh-CN" sz="5400" b="1" dirty="0">
+                <a:ln w="9525">
+                  <a:solidFill>
+                    <a:schemeClr val="bg1"/>
+                  </a:solidFill>
+                  <a:prstDash val="solid"/>
+                </a:ln>
+                <a:solidFill>
+                  <a:schemeClr val="accent5"/>
+                </a:solidFill>
+                <a:effectLst>
+                  <a:outerShdw blurRad="12700" dist="38100" dir="2700000" algn="tl" rotWithShape="0">
+                    <a:schemeClr val="accent5">
+                      <a:lumMod val="60000"/>
+                      <a:lumOff val="40000"/>
+                    </a:schemeClr>
+                  </a:outerShdw>
+                </a:effectLst>
+              </a:rPr>
+              <a:t>Check </a:t>
+            </a:r>
+          </a:p>
+          <a:p>
+            <a:pPr algn="ctr"/>
+            <a:r>
+              <a:rPr lang="en-US" altLang="zh-CN" sz="5400" b="1" dirty="0">
+                <a:ln w="9525">
+                  <a:solidFill>
+                    <a:schemeClr val="bg1"/>
+                  </a:solidFill>
+                  <a:prstDash val="solid"/>
+                </a:ln>
+                <a:solidFill>
+                  <a:schemeClr val="accent5"/>
+                </a:solidFill>
+                <a:effectLst>
+                  <a:outerShdw blurRad="12700" dist="38100" dir="2700000" algn="tl" rotWithShape="0">
+                    <a:schemeClr val="accent5">
+                      <a:lumMod val="60000"/>
+                      <a:lumOff val="40000"/>
+                    </a:schemeClr>
+                  </a:outerShdw>
+                </a:effectLst>
+              </a:rPr>
+              <a:t>the shopping cart</a:t>
+            </a:r>
+          </a:p>
+          <a:p>
+            <a:pPr algn="ctr"/>
+            <a:r>
+              <a:rPr lang="en-AU" altLang="zh-CN" sz="5400" b="1" dirty="0">
+                <a:ln w="9525">
+                  <a:solidFill>
+                    <a:schemeClr val="bg1"/>
+                  </a:solidFill>
+                  <a:prstDash val="solid"/>
+                </a:ln>
+                <a:solidFill>
+                  <a:schemeClr val="accent5"/>
+                </a:solidFill>
+                <a:effectLst>
+                  <a:outerShdw blurRad="12700" dist="38100" dir="2700000" algn="tl" rotWithShape="0">
+                    <a:schemeClr val="accent5">
+                      <a:lumMod val="60000"/>
+                      <a:lumOff val="40000"/>
+                    </a:schemeClr>
+                  </a:outerShdw>
+                </a:effectLst>
+              </a:rPr>
+              <a:t>through CUI</a:t>
+            </a:r>
+            <a:endParaRPr lang="en-US" sz="5400" b="1" cap="none" spc="0" dirty="0">
+              <a:ln w="9525">
+                <a:solidFill>
+                  <a:schemeClr val="bg1"/>
+                </a:solidFill>
+                <a:prstDash val="solid"/>
+              </a:ln>
+              <a:solidFill>
+                <a:schemeClr val="accent5"/>
+              </a:solidFill>
+              <a:effectLst>
+                <a:outerShdw blurRad="12700" dist="38100" dir="2700000" algn="tl" rotWithShape="0">
+                  <a:schemeClr val="accent5">
+                    <a:lumMod val="60000"/>
+                    <a:lumOff val="40000"/>
+                  </a:schemeClr>
+                </a:outerShdw>
+              </a:effectLst>
+            </a:endParaRPr>
+          </a:p>
+        </p:txBody>
+      </p:sp>
+      <p:cxnSp>
+        <p:nvCxnSpPr>
+          <p:cNvPr id="37" name="Connector: Elbow 36">
+            <a:extLst>
+              <a:ext uri="{FF2B5EF4-FFF2-40B4-BE49-F238E27FC236}">
+                <a16:creationId xmlns:a16="http://schemas.microsoft.com/office/drawing/2014/main" id="{6AB9C738-28B2-44D4-8C02-065A3C7FEB63}"/>
+              </a:ext>
+            </a:extLst>
+          </p:cNvPr>
+          <p:cNvCxnSpPr>
+            <a:stCxn id="48" idx="3"/>
+          </p:cNvCxnSpPr>
+          <p:nvPr/>
+        </p:nvCxnSpPr>
+        <p:spPr>
+          <a:xfrm flipV="1">
+            <a:off x="1957846" y="3932322"/>
+            <a:ext cx="529660" cy="973056"/>
+          </a:xfrm>
+          <a:prstGeom prst="bentConnector2">
+            <a:avLst/>
+          </a:prstGeom>
+          <a:ln w="19050">
+            <a:tailEnd type="triangle"/>
+          </a:ln>
+        </p:spPr>
+        <p:style>
+          <a:lnRef idx="1">
+            <a:schemeClr val="dk1"/>
+          </a:lnRef>
+          <a:fillRef idx="0">
+            <a:schemeClr val="dk1"/>
+          </a:fillRef>
+          <a:effectRef idx="0">
+            <a:schemeClr val="dk1"/>
+          </a:effectRef>
+          <a:fontRef idx="minor">
+            <a:schemeClr val="tx1"/>
+          </a:fontRef>
+        </p:style>
+      </p:cxnSp>
+    </p:spTree>
+    <p:extLst>
+      <p:ext uri="{BB962C8B-B14F-4D97-AF65-F5344CB8AC3E}">
+        <p14:creationId xmlns:p14="http://schemas.microsoft.com/office/powerpoint/2010/main" val="3817206712"/>
+      </p:ext>
+    </p:extLst>
+  </p:cSld>
+  <p:clrMapOvr>
+    <a:masterClrMapping/>
+  </p:clrMapOvr>
+</p:sld>
+</file>
+
 <file path=ppt/theme/theme1.xml><?xml version="1.0" encoding="utf-8"?>
 <a:theme xmlns:a="http://schemas.openxmlformats.org/drawingml/2006/main" name="Office Theme">
   <a:themeElements>

</xml_diff>